<commit_message>
All Tablet Files revised and moved from lessons.html to new tablet page
</commit_message>
<xml_diff>
--- a/translations/en-us/beginner/Loops.pptx
+++ b/translations/en-us/beginner/Loops.pptx
@@ -218,7 +218,7 @@
           <a:p>
             <a:fld id="{F8D9B3D7-15CB-9343-AA49-EFB5A8F33F18}" type="datetimeFigureOut">
               <a:rPr lang="en-US" smtClean="0"/>
-              <a:t>7/19/16</a:t>
+              <a:t>7/26/16</a:t>
             </a:fld>
             <a:endParaRPr lang="en-US"/>
           </a:p>
@@ -384,7 +384,7 @@
           <a:p>
             <a:fld id="{FD3EFF1E-85A1-6640-AFB9-C38833E80A84}" type="datetimeFigureOut">
               <a:rPr lang="en-US" smtClean="0"/>
-              <a:t>7/19/16</a:t>
+              <a:t>7/26/16</a:t>
             </a:fld>
             <a:endParaRPr lang="en-US"/>
           </a:p>
@@ -737,6 +737,90 @@
 </p:notes>
 </file>
 
+<file path=ppt/notesSlides/notesSlide2.xml><?xml version="1.0" encoding="utf-8"?>
+<p:notes xmlns:a="http://schemas.openxmlformats.org/drawingml/2006/main" xmlns:r="http://schemas.openxmlformats.org/officeDocument/2006/relationships" xmlns:p="http://schemas.openxmlformats.org/presentationml/2006/main">
+  <p:cSld>
+    <p:spTree>
+      <p:nvGrpSpPr>
+        <p:cNvPr id="1" name=""/>
+        <p:cNvGrpSpPr/>
+        <p:nvPr/>
+      </p:nvGrpSpPr>
+      <p:grpSpPr>
+        <a:xfrm>
+          <a:off x="0" y="0"/>
+          <a:ext cx="0" cy="0"/>
+          <a:chOff x="0" y="0"/>
+          <a:chExt cx="0" cy="0"/>
+        </a:xfrm>
+      </p:grpSpPr>
+      <p:sp>
+        <p:nvSpPr>
+          <p:cNvPr id="2" name="Slide Image Placeholder 1"/>
+          <p:cNvSpPr>
+            <a:spLocks noGrp="1" noRot="1" noChangeAspect="1"/>
+          </p:cNvSpPr>
+          <p:nvPr>
+            <p:ph type="sldImg"/>
+          </p:nvPr>
+        </p:nvSpPr>
+        <p:spPr/>
+      </p:sp>
+      <p:sp>
+        <p:nvSpPr>
+          <p:cNvPr id="3" name="Notes Placeholder 2"/>
+          <p:cNvSpPr>
+            <a:spLocks noGrp="1"/>
+          </p:cNvSpPr>
+          <p:nvPr>
+            <p:ph type="body" idx="1"/>
+          </p:nvPr>
+        </p:nvSpPr>
+        <p:spPr/>
+        <p:txBody>
+          <a:bodyPr/>
+          <a:lstStyle/>
+          <a:p>
+            <a:endParaRPr lang="en-US"/>
+          </a:p>
+        </p:txBody>
+      </p:sp>
+      <p:sp>
+        <p:nvSpPr>
+          <p:cNvPr id="4" name="Slide Number Placeholder 3"/>
+          <p:cNvSpPr>
+            <a:spLocks noGrp="1"/>
+          </p:cNvSpPr>
+          <p:nvPr>
+            <p:ph type="sldNum" sz="quarter" idx="10"/>
+          </p:nvPr>
+        </p:nvSpPr>
+        <p:spPr/>
+        <p:txBody>
+          <a:bodyPr/>
+          <a:lstStyle/>
+          <a:p>
+            <a:fld id="{13967457-1E83-1040-AFF7-8D09C473DBD5}" type="slidenum">
+              <a:rPr lang="en-US" smtClean="0"/>
+              <a:t>2</a:t>
+            </a:fld>
+            <a:endParaRPr lang="en-US"/>
+          </a:p>
+        </p:txBody>
+      </p:sp>
+    </p:spTree>
+    <p:extLst>
+      <p:ext uri="{BB962C8B-B14F-4D97-AF65-F5344CB8AC3E}">
+        <p14:creationId xmlns:p14="http://schemas.microsoft.com/office/powerpoint/2010/main" val="202319656"/>
+      </p:ext>
+    </p:extLst>
+  </p:cSld>
+  <p:clrMapOvr>
+    <a:masterClrMapping/>
+  </p:clrMapOvr>
+</p:notes>
+</file>
+
 <file path=ppt/slideLayouts/slideLayout1.xml><?xml version="1.0" encoding="utf-8"?>
 <p:sldLayout xmlns:a="http://schemas.openxmlformats.org/drawingml/2006/main" xmlns:r="http://schemas.openxmlformats.org/officeDocument/2006/relationships" xmlns:p="http://schemas.openxmlformats.org/presentationml/2006/main" showMasterSp="0" preserve="1">
   <p:cSld name="Title Slide">
@@ -887,9 +971,9 @@
           <a:bodyPr/>
           <a:lstStyle/>
           <a:p>
-            <a:fld id="{B41DCFFF-3180-B14B-B5E5-26BA2D43A538}" type="datetime1">
-              <a:rPr lang="en-US" smtClean="0"/>
-              <a:t>7/19/16</a:t>
+            <a:fld id="{285EF27D-8752-DA47-8D7E-2F48280CEEBD}" type="datetime1">
+              <a:rPr lang="en-US" smtClean="0"/>
+              <a:t>7/26/16</a:t>
             </a:fld>
             <a:endParaRPr lang="en-US"/>
           </a:p>
@@ -917,7 +1001,7 @@
           <a:p>
             <a:r>
               <a:rPr lang="en-US" smtClean="0"/>
-              <a:t>© EV3Lessons.com, 2016, (Last edit: 7/04/2016)</a:t>
+              <a:t>© EV3Lessons.com, 2016, (Last edit: 7/26/2016)</a:t>
             </a:r>
             <a:endParaRPr lang="en-US"/>
           </a:p>
@@ -1108,7 +1192,7 @@
           <a:noFill/>
           <a:extLst>
             <a:ext uri="{909E8E84-426E-40dd-AFC4-6F175D3DCCD1}">
-              <a14:hiddenFill xmlns="" xmlns:a14="http://schemas.microsoft.com/office/drawing/2010/main">
+              <a14:hiddenFill xmlns:a14="http://schemas.microsoft.com/office/drawing/2010/main" xmlns="">
                 <a:solidFill>
                   <a:srgbClr val="FFFFFF"/>
                 </a:solidFill>
@@ -1449,9 +1533,9 @@
           <a:bodyPr/>
           <a:lstStyle/>
           <a:p>
-            <a:fld id="{CB9D08AF-0752-9648-9B26-1313BE9BBFC4}" type="datetime1">
-              <a:rPr lang="en-US" smtClean="0"/>
-              <a:t>7/19/16</a:t>
+            <a:fld id="{B60890B9-E024-BA42-9704-A64AD3034426}" type="datetime1">
+              <a:rPr lang="en-US" smtClean="0"/>
+              <a:t>7/26/16</a:t>
             </a:fld>
             <a:endParaRPr lang="en-US"/>
           </a:p>
@@ -1474,7 +1558,7 @@
           <a:p>
             <a:r>
               <a:rPr lang="en-US" smtClean="0"/>
-              <a:t>© EV3Lessons.com, 2016, (Last edit: 7/04/2016)</a:t>
+              <a:t>© EV3Lessons.com, 2016, (Last edit: 7/26/2016)</a:t>
             </a:r>
             <a:endParaRPr lang="en-US"/>
           </a:p>
@@ -1641,9 +1725,9 @@
           <a:bodyPr/>
           <a:lstStyle/>
           <a:p>
-            <a:fld id="{84A0EC50-32B4-714D-A95A-A20F643D9595}" type="datetime1">
-              <a:rPr lang="en-US" smtClean="0"/>
-              <a:t>7/19/16</a:t>
+            <a:fld id="{22A91C9D-C322-9642-A879-CBC9D9628B53}" type="datetime1">
+              <a:rPr lang="en-US" smtClean="0"/>
+              <a:t>7/26/16</a:t>
             </a:fld>
             <a:endParaRPr lang="en-US"/>
           </a:p>
@@ -1666,7 +1750,7 @@
           <a:p>
             <a:r>
               <a:rPr lang="en-US" smtClean="0"/>
-              <a:t>© EV3Lessons.com, 2016, (Last edit: 7/04/2016)</a:t>
+              <a:t>© EV3Lessons.com, 2016, (Last edit: 7/26/2016)</a:t>
             </a:r>
             <a:endParaRPr lang="en-US"/>
           </a:p>
@@ -1845,9 +1929,9 @@
           <a:bodyPr/>
           <a:lstStyle/>
           <a:p>
-            <a:fld id="{5621E052-628E-F14A-A84F-D6C3117A028F}" type="datetime1">
-              <a:rPr lang="en-US" smtClean="0"/>
-              <a:t>7/19/16</a:t>
+            <a:fld id="{30FD59F4-988B-4F4A-8FAA-FF739FF4538A}" type="datetime1">
+              <a:rPr lang="en-US" smtClean="0"/>
+              <a:t>7/26/16</a:t>
             </a:fld>
             <a:endParaRPr lang="en-US"/>
           </a:p>
@@ -1870,7 +1954,7 @@
           <a:p>
             <a:r>
               <a:rPr lang="en-US" smtClean="0"/>
-              <a:t>© EV3Lessons.com, 2016, (Last edit: 7/04/2016)</a:t>
+              <a:t>© EV3Lessons.com, 2016, (Last edit: 7/26/2016)</a:t>
             </a:r>
             <a:endParaRPr lang="en-US"/>
           </a:p>
@@ -2019,9 +2103,9 @@
           <a:bodyPr/>
           <a:lstStyle/>
           <a:p>
-            <a:fld id="{4CBD7A79-8C4D-6841-A406-FE765EC9A82B}" type="datetime1">
-              <a:rPr lang="en-US" smtClean="0"/>
-              <a:t>7/19/16</a:t>
+            <a:fld id="{4AA47985-A0DF-324F-8187-D0D4AD0F6BF2}" type="datetime1">
+              <a:rPr lang="en-US" smtClean="0"/>
+              <a:t>7/26/16</a:t>
             </a:fld>
             <a:endParaRPr lang="en-US"/>
           </a:p>
@@ -2044,7 +2128,7 @@
           <a:p>
             <a:r>
               <a:rPr lang="en-US" smtClean="0"/>
-              <a:t>© EV3Lessons.com, 2016, (Last edit: 7/04/2016)</a:t>
+              <a:t>© EV3Lessons.com, 2016, (Last edit: 7/26/2016)</a:t>
             </a:r>
             <a:endParaRPr lang="en-US"/>
           </a:p>
@@ -2269,9 +2353,9 @@
           <a:bodyPr/>
           <a:lstStyle/>
           <a:p>
-            <a:fld id="{D6FEC789-49FB-7442-B3B8-9CC0C5250B6C}" type="datetime1">
-              <a:rPr lang="en-US" smtClean="0"/>
-              <a:t>7/19/16</a:t>
+            <a:fld id="{035346D9-F88E-FF42-812F-74AA2C7E9C0D}" type="datetime1">
+              <a:rPr lang="en-US" smtClean="0"/>
+              <a:t>7/26/16</a:t>
             </a:fld>
             <a:endParaRPr lang="en-US"/>
           </a:p>
@@ -2294,7 +2378,7 @@
           <a:p>
             <a:r>
               <a:rPr lang="en-US" smtClean="0"/>
-              <a:t>© EV3Lessons.com, 2016, (Last edit: 7/04/2016)</a:t>
+              <a:t>© EV3Lessons.com, 2016, (Last edit: 7/26/2016)</a:t>
             </a:r>
             <a:endParaRPr lang="en-US"/>
           </a:p>
@@ -2505,9 +2589,9 @@
           <a:bodyPr/>
           <a:lstStyle/>
           <a:p>
-            <a:fld id="{DFDC536A-AD42-0D41-807A-C785035DECE9}" type="datetime1">
-              <a:rPr lang="en-US" smtClean="0"/>
-              <a:t>7/19/16</a:t>
+            <a:fld id="{94FF9039-61CF-4745-B2F8-D868E6208AB2}" type="datetime1">
+              <a:rPr lang="en-US" smtClean="0"/>
+              <a:t>7/26/16</a:t>
             </a:fld>
             <a:endParaRPr lang="en-US"/>
           </a:p>
@@ -2530,7 +2614,7 @@
           <a:p>
             <a:r>
               <a:rPr lang="en-US" smtClean="0"/>
-              <a:t>© EV3Lessons.com, 2016, (Last edit: 7/04/2016)</a:t>
+              <a:t>© EV3Lessons.com, 2016, (Last edit: 7/26/2016)</a:t>
             </a:r>
             <a:endParaRPr lang="en-US"/>
           </a:p>
@@ -2876,9 +2960,9 @@
           <a:bodyPr/>
           <a:lstStyle/>
           <a:p>
-            <a:fld id="{23A22DC0-0E3E-4E4F-9D65-0A062092EE9F}" type="datetime1">
-              <a:rPr lang="en-US" smtClean="0"/>
-              <a:t>7/19/16</a:t>
+            <a:fld id="{A401E130-BE25-AB42-9612-80B178AA6DD9}" type="datetime1">
+              <a:rPr lang="en-US" smtClean="0"/>
+              <a:t>7/26/16</a:t>
             </a:fld>
             <a:endParaRPr lang="en-US"/>
           </a:p>
@@ -2901,7 +2985,7 @@
           <a:p>
             <a:r>
               <a:rPr lang="en-US" smtClean="0"/>
-              <a:t>© EV3Lessons.com, 2016, (Last edit: 7/04/2016)</a:t>
+              <a:t>© EV3Lessons.com, 2016, (Last edit: 7/26/2016)</a:t>
             </a:r>
             <a:endParaRPr lang="en-US"/>
           </a:p>
@@ -2998,9 +3082,9 @@
           <a:bodyPr/>
           <a:lstStyle/>
           <a:p>
-            <a:fld id="{123734A8-898F-D042-81C5-87B9B7317C9D}" type="datetime1">
-              <a:rPr lang="en-US" smtClean="0"/>
-              <a:t>7/19/16</a:t>
+            <a:fld id="{CD051783-2236-BE42-9499-8A2A1CC8E02A}" type="datetime1">
+              <a:rPr lang="en-US" smtClean="0"/>
+              <a:t>7/26/16</a:t>
             </a:fld>
             <a:endParaRPr lang="en-US"/>
           </a:p>
@@ -3023,7 +3107,7 @@
           <a:p>
             <a:r>
               <a:rPr lang="en-US" smtClean="0"/>
-              <a:t>© EV3Lessons.com, 2016, (Last edit: 7/04/2016)</a:t>
+              <a:t>© EV3Lessons.com, 2016, (Last edit: 7/26/2016)</a:t>
             </a:r>
             <a:endParaRPr lang="en-US"/>
           </a:p>
@@ -3097,9 +3181,9 @@
           <a:bodyPr/>
           <a:lstStyle/>
           <a:p>
-            <a:fld id="{684AB457-B71C-5143-826A-B48C11D31984}" type="datetime1">
-              <a:rPr lang="en-US" smtClean="0"/>
-              <a:t>7/19/16</a:t>
+            <a:fld id="{ECC260FD-C0F5-6B4C-8DF5-6BFA3F60F43A}" type="datetime1">
+              <a:rPr lang="en-US" smtClean="0"/>
+              <a:t>7/26/16</a:t>
             </a:fld>
             <a:endParaRPr lang="en-US"/>
           </a:p>
@@ -3122,7 +3206,7 @@
           <a:p>
             <a:r>
               <a:rPr lang="en-US" smtClean="0"/>
-              <a:t>© EV3Lessons.com, 2016, (Last edit: 7/04/2016)</a:t>
+              <a:t>© EV3Lessons.com, 2016, (Last edit: 7/26/2016)</a:t>
             </a:r>
             <a:endParaRPr lang="en-US"/>
           </a:p>
@@ -3378,9 +3462,9 @@
           <a:bodyPr/>
           <a:lstStyle/>
           <a:p>
-            <a:fld id="{45FD3294-A232-044D-BA94-ACD8E6488E61}" type="datetime1">
-              <a:rPr lang="en-US" smtClean="0"/>
-              <a:t>7/19/16</a:t>
+            <a:fld id="{365B0ECF-EC10-7446-87A9-63B618D8242A}" type="datetime1">
+              <a:rPr lang="en-US" smtClean="0"/>
+              <a:t>7/26/16</a:t>
             </a:fld>
             <a:endParaRPr lang="en-US"/>
           </a:p>
@@ -3403,7 +3487,7 @@
           <a:p>
             <a:r>
               <a:rPr lang="en-US" smtClean="0"/>
-              <a:t>© EV3Lessons.com, 2016, (Last edit: 7/04/2016)</a:t>
+              <a:t>© EV3Lessons.com, 2016, (Last edit: 7/26/2016)</a:t>
             </a:r>
             <a:endParaRPr lang="en-US"/>
           </a:p>
@@ -3562,9 +3646,9 @@
           <a:bodyPr/>
           <a:lstStyle/>
           <a:p>
-            <a:fld id="{305B0AC6-3446-034C-AC71-AAAF263EC69F}" type="datetime1">
-              <a:rPr lang="en-US" smtClean="0"/>
-              <a:t>7/19/16</a:t>
+            <a:fld id="{2F164C2F-CF2F-8D49-9730-279D575D6EF4}" type="datetime1">
+              <a:rPr lang="en-US" smtClean="0"/>
+              <a:t>7/26/16</a:t>
             </a:fld>
             <a:endParaRPr lang="en-US"/>
           </a:p>
@@ -3587,7 +3671,7 @@
           <a:p>
             <a:r>
               <a:rPr lang="en-US" smtClean="0"/>
-              <a:t>© EV3Lessons.com, 2016, (Last edit: 7/04/2016)</a:t>
+              <a:t>© EV3Lessons.com, 2016, (Last edit: 7/26/2016)</a:t>
             </a:r>
             <a:endParaRPr lang="en-US"/>
           </a:p>
@@ -3838,9 +3922,9 @@
           <a:bodyPr/>
           <a:lstStyle/>
           <a:p>
-            <a:fld id="{7C7B0225-8752-564D-91D0-3CAA192F1D5D}" type="datetime1">
-              <a:rPr lang="en-US" smtClean="0"/>
-              <a:t>7/19/16</a:t>
+            <a:fld id="{F6BEDEB7-093F-3145-914C-BFCD1032C9B5}" type="datetime1">
+              <a:rPr lang="en-US" smtClean="0"/>
+              <a:t>7/26/16</a:t>
             </a:fld>
             <a:endParaRPr lang="en-US"/>
           </a:p>
@@ -3863,7 +3947,7 @@
           <a:p>
             <a:r>
               <a:rPr lang="en-US" smtClean="0"/>
-              <a:t>© EV3Lessons.com, 2016, (Last edit: 7/04/2016)</a:t>
+              <a:t>© EV3Lessons.com, 2016, (Last edit: 7/26/2016)</a:t>
             </a:r>
             <a:endParaRPr lang="en-US"/>
           </a:p>
@@ -4012,9 +4096,9 @@
           <a:bodyPr/>
           <a:lstStyle/>
           <a:p>
-            <a:fld id="{0FE9D2F1-1454-DC49-880E-D3AD9E72360F}" type="datetime1">
-              <a:rPr lang="en-US" smtClean="0"/>
-              <a:t>7/19/16</a:t>
+            <a:fld id="{7024651B-78BF-264C-99D5-7D13BA71184C}" type="datetime1">
+              <a:rPr lang="en-US" smtClean="0"/>
+              <a:t>7/26/16</a:t>
             </a:fld>
             <a:endParaRPr lang="en-US"/>
           </a:p>
@@ -4037,7 +4121,7 @@
           <a:p>
             <a:r>
               <a:rPr lang="en-US" smtClean="0"/>
-              <a:t>© EV3Lessons.com, 2016, (Last edit: 7/04/2016)</a:t>
+              <a:t>© EV3Lessons.com, 2016, (Last edit: 7/26/2016)</a:t>
             </a:r>
             <a:endParaRPr lang="en-US"/>
           </a:p>
@@ -4196,9 +4280,9 @@
           <a:bodyPr/>
           <a:lstStyle/>
           <a:p>
-            <a:fld id="{FF628EDF-D75E-9648-A22C-C5829CD52CFB}" type="datetime1">
-              <a:rPr lang="en-US" smtClean="0"/>
-              <a:t>7/19/16</a:t>
+            <a:fld id="{6C840F25-7E4A-9547-A239-7D2C39C8BA83}" type="datetime1">
+              <a:rPr lang="en-US" smtClean="0"/>
+              <a:t>7/26/16</a:t>
             </a:fld>
             <a:endParaRPr lang="en-US"/>
           </a:p>
@@ -4221,7 +4305,7 @@
           <a:p>
             <a:r>
               <a:rPr lang="en-US" smtClean="0"/>
-              <a:t>© EV3Lessons.com, 2016, (Last edit: 7/04/2016)</a:t>
+              <a:t>© EV3Lessons.com, 2016, (Last edit: 7/26/2016)</a:t>
             </a:r>
             <a:endParaRPr lang="en-US"/>
           </a:p>
@@ -4454,9 +4538,9 @@
           <a:bodyPr/>
           <a:lstStyle/>
           <a:p>
-            <a:fld id="{053A68E7-86AE-B94C-8CDD-D880EDD55491}" type="datetime1">
-              <a:rPr lang="en-US" smtClean="0"/>
-              <a:t>7/19/16</a:t>
+            <a:fld id="{0C440D35-5944-1242-8AD2-54CB9F88DCD6}" type="datetime1">
+              <a:rPr lang="en-US" smtClean="0"/>
+              <a:t>7/26/16</a:t>
             </a:fld>
             <a:endParaRPr lang="en-US"/>
           </a:p>
@@ -4510,7 +4594,7 @@
           <a:p>
             <a:r>
               <a:rPr lang="en-US" smtClean="0"/>
-              <a:t>© EV3Lessons.com, 2016, (Last edit: 7/04/2016)</a:t>
+              <a:t>© EV3Lessons.com, 2016, (Last edit: 7/26/2016)</a:t>
             </a:r>
             <a:endParaRPr lang="en-US"/>
           </a:p>
@@ -4759,9 +4843,9 @@
           <a:bodyPr/>
           <a:lstStyle/>
           <a:p>
-            <a:fld id="{3FAFFF49-143A-4645-A51E-CB911277389F}" type="datetime1">
-              <a:rPr lang="en-US" smtClean="0"/>
-              <a:t>7/19/16</a:t>
+            <a:fld id="{4ECE6BFD-AD9A-8F49-9177-DBC967179F4C}" type="datetime1">
+              <a:rPr lang="en-US" smtClean="0"/>
+              <a:t>7/26/16</a:t>
             </a:fld>
             <a:endParaRPr lang="en-US"/>
           </a:p>
@@ -4784,7 +4868,7 @@
           <a:p>
             <a:r>
               <a:rPr lang="en-US" smtClean="0"/>
-              <a:t>© EV3Lessons.com, 2016, (Last edit: 7/04/2016)</a:t>
+              <a:t>© EV3Lessons.com, 2016, (Last edit: 7/26/2016)</a:t>
             </a:r>
             <a:endParaRPr lang="en-US"/>
           </a:p>
@@ -5222,9 +5306,9 @@
           <a:bodyPr/>
           <a:lstStyle/>
           <a:p>
-            <a:fld id="{B4979853-F90F-3E4C-81E3-44430E02C514}" type="datetime1">
-              <a:rPr lang="en-US" smtClean="0"/>
-              <a:t>7/19/16</a:t>
+            <a:fld id="{194C1C2A-38E9-D84B-9F49-E9BC372FC647}" type="datetime1">
+              <a:rPr lang="en-US" smtClean="0"/>
+              <a:t>7/26/16</a:t>
             </a:fld>
             <a:endParaRPr lang="en-US"/>
           </a:p>
@@ -5247,7 +5331,7 @@
           <a:p>
             <a:r>
               <a:rPr lang="en-US" smtClean="0"/>
-              <a:t>© EV3Lessons.com, 2016, (Last edit: 7/04/2016)</a:t>
+              <a:t>© EV3Lessons.com, 2016, (Last edit: 7/26/2016)</a:t>
             </a:r>
             <a:endParaRPr lang="en-US"/>
           </a:p>
@@ -5359,9 +5443,9 @@
           <a:bodyPr/>
           <a:lstStyle/>
           <a:p>
-            <a:fld id="{035AFEF4-1CB3-0B42-9488-1737F8947CCB}" type="datetime1">
-              <a:rPr lang="en-US" smtClean="0"/>
-              <a:t>7/19/16</a:t>
+            <a:fld id="{55658CD0-EB20-D248-A310-A97AFCAECA44}" type="datetime1">
+              <a:rPr lang="en-US" smtClean="0"/>
+              <a:t>7/26/16</a:t>
             </a:fld>
             <a:endParaRPr lang="en-US"/>
           </a:p>
@@ -5384,7 +5468,7 @@
           <a:p>
             <a:r>
               <a:rPr lang="en-US" smtClean="0"/>
-              <a:t>© EV3Lessons.com, 2016, (Last edit: 7/04/2016)</a:t>
+              <a:t>© EV3Lessons.com, 2016, (Last edit: 7/26/2016)</a:t>
             </a:r>
             <a:endParaRPr lang="en-US"/>
           </a:p>
@@ -5473,9 +5557,9 @@
           <a:bodyPr/>
           <a:lstStyle/>
           <a:p>
-            <a:fld id="{EA379F84-3529-9E43-9CE0-27FCAF146DEC}" type="datetime1">
-              <a:rPr lang="en-US" smtClean="0"/>
-              <a:t>7/19/16</a:t>
+            <a:fld id="{5BD46B12-2296-264F-AA90-88605EA6A220}" type="datetime1">
+              <a:rPr lang="en-US" smtClean="0"/>
+              <a:t>7/26/16</a:t>
             </a:fld>
             <a:endParaRPr lang="en-US"/>
           </a:p>
@@ -5498,7 +5582,7 @@
           <a:p>
             <a:r>
               <a:rPr lang="en-US" smtClean="0"/>
-              <a:t>© EV3Lessons.com, 2016, (Last edit: 7/04/2016)</a:t>
+              <a:t>© EV3Lessons.com, 2016, (Last edit: 7/26/2016)</a:t>
             </a:r>
             <a:endParaRPr lang="en-US"/>
           </a:p>
@@ -5732,9 +5816,9 @@
           <a:bodyPr/>
           <a:lstStyle/>
           <a:p>
-            <a:fld id="{7941E5C0-7A1C-CF46-813E-5688B577D40F}" type="datetime1">
-              <a:rPr lang="en-US" smtClean="0"/>
-              <a:t>7/19/16</a:t>
+            <a:fld id="{D5C0B56A-5E28-A144-83AC-55A603D0136C}" type="datetime1">
+              <a:rPr lang="en-US" smtClean="0"/>
+              <a:t>7/26/16</a:t>
             </a:fld>
             <a:endParaRPr lang="en-US"/>
           </a:p>
@@ -5757,7 +5841,7 @@
           <a:p>
             <a:r>
               <a:rPr lang="en-US" smtClean="0"/>
-              <a:t>© EV3Lessons.com, 2016, (Last edit: 7/04/2016)</a:t>
+              <a:t>© EV3Lessons.com, 2016, (Last edit: 7/26/2016)</a:t>
             </a:r>
             <a:endParaRPr lang="en-US"/>
           </a:p>
@@ -6043,9 +6127,9 @@
           <a:bodyPr/>
           <a:lstStyle/>
           <a:p>
-            <a:fld id="{BFA4DF06-EB1C-AA45-8F61-B383035F8826}" type="datetime1">
-              <a:rPr lang="en-US" smtClean="0"/>
-              <a:t>7/19/16</a:t>
+            <a:fld id="{C38CAB88-2F47-224D-A2B6-8BABE3AD154C}" type="datetime1">
+              <a:rPr lang="en-US" smtClean="0"/>
+              <a:t>7/26/16</a:t>
             </a:fld>
             <a:endParaRPr lang="en-US"/>
           </a:p>
@@ -6068,7 +6152,7 @@
           <a:p>
             <a:r>
               <a:rPr lang="en-US" smtClean="0"/>
-              <a:t>© EV3Lessons.com, 2016, (Last edit: 7/04/2016)</a:t>
+              <a:t>© EV3Lessons.com, 2016, (Last edit: 7/26/2016)</a:t>
             </a:r>
             <a:endParaRPr lang="en-US"/>
           </a:p>
@@ -6354,9 +6438,9 @@
             </a:lvl1pPr>
           </a:lstStyle>
           <a:p>
-            <a:fld id="{CC4ABEF4-6A55-BC42-99E2-09DD0B13F66C}" type="datetime1">
-              <a:rPr lang="en-US" smtClean="0"/>
-              <a:t>7/19/16</a:t>
+            <a:fld id="{127D35FA-12D4-364A-BDC9-22E311CBD480}" type="datetime1">
+              <a:rPr lang="en-US" smtClean="0"/>
+              <a:t>7/26/16</a:t>
             </a:fld>
             <a:endParaRPr lang="en-US"/>
           </a:p>
@@ -6395,7 +6479,7 @@
           <a:p>
             <a:r>
               <a:rPr lang="en-US" smtClean="0"/>
-              <a:t>© EV3Lessons.com, 2016, (Last edit: 7/04/2016)</a:t>
+              <a:t>© EV3Lessons.com, 2016, (Last edit: 7/26/2016)</a:t>
             </a:r>
             <a:endParaRPr lang="en-US"/>
           </a:p>
@@ -7140,9 +7224,9 @@
             </a:lvl1pPr>
           </a:lstStyle>
           <a:p>
-            <a:fld id="{A94CCF2C-3F06-1B4E-AF8F-CB63FD771C74}" type="datetime1">
-              <a:rPr lang="en-US" smtClean="0"/>
-              <a:t>7/19/16</a:t>
+            <a:fld id="{F7EC531C-CBE1-1F45-BF7C-8B49A3846760}" type="datetime1">
+              <a:rPr lang="en-US" smtClean="0"/>
+              <a:t>7/26/16</a:t>
             </a:fld>
             <a:endParaRPr lang="en-US"/>
           </a:p>
@@ -7183,7 +7267,7 @@
           <a:p>
             <a:r>
               <a:rPr lang="en-US" smtClean="0"/>
-              <a:t>© EV3Lessons.com, 2016, (Last edit: 7/04/2016)</a:t>
+              <a:t>© EV3Lessons.com, 2016, (Last edit: 7/26/2016)</a:t>
             </a:r>
             <a:endParaRPr lang="en-US"/>
           </a:p>
@@ -7735,7 +7819,7 @@
           <a:p>
             <a:r>
               <a:rPr lang="en-US" smtClean="0"/>
-              <a:t>© EV3Lessons.com, 2016, (Last edit: 7/04/2016)</a:t>
+              <a:t>© EV3Lessons.com, 2016, (Last edit: 7/26/2016)</a:t>
             </a:r>
             <a:endParaRPr lang="en-US"/>
           </a:p>
@@ -7841,29 +7925,40 @@
           <a:p>
             <a:r>
               <a:rPr lang="en-US" sz="2800" dirty="0" smtClean="0"/>
-              <a:t>How can we play two different tasks multiple times (even forever)</a:t>
-            </a:r>
-          </a:p>
-          <a:p>
-            <a:endParaRPr lang="en-US" sz="2800" dirty="0"/>
+              <a:t>Let’s say we want the robot to repeat an action over and over again.</a:t>
+            </a:r>
           </a:p>
           <a:p>
             <a:r>
               <a:rPr lang="en-US" sz="2800" dirty="0" smtClean="0"/>
-              <a:t>You could do this and copy the two blocks several times:</a:t>
-            </a:r>
-          </a:p>
-          <a:p>
-            <a:endParaRPr lang="en-US" sz="2800" dirty="0"/>
-          </a:p>
-          <a:p>
-            <a:endParaRPr lang="en-US" dirty="0" smtClean="0"/>
-          </a:p>
-          <a:p>
-            <a:endParaRPr lang="en-US" dirty="0" smtClean="0"/>
-          </a:p>
-          <a:p>
-            <a:pPr lvl="1"/>
+              <a:t>Would you just copy the block multiple times?</a:t>
+            </a:r>
+          </a:p>
+          <a:p>
+            <a:r>
+              <a:rPr lang="en-US" sz="2800" dirty="0"/>
+              <a:t>	</a:t>
+            </a:r>
+            <a:r>
+              <a:rPr lang="en-US" sz="2800" dirty="0" smtClean="0"/>
+              <a:t>Sure, that could work!</a:t>
+            </a:r>
+          </a:p>
+          <a:p>
+            <a:r>
+              <a:rPr lang="en-US" sz="2800" dirty="0" smtClean="0"/>
+              <a:t>What if I want to repeat that block forever? </a:t>
+            </a:r>
+          </a:p>
+          <a:p>
+            <a:r>
+              <a:rPr lang="en-US" sz="2800" dirty="0"/>
+              <a:t>	</a:t>
+            </a:r>
+            <a:r>
+              <a:rPr lang="en-US" sz="2800" dirty="0" smtClean="0"/>
+              <a:t>Now what?</a:t>
+            </a:r>
             <a:endParaRPr lang="en-US" dirty="0"/>
           </a:p>
         </p:txBody>
@@ -7885,7 +7980,7 @@
           <a:p>
             <a:r>
               <a:rPr lang="en-US" smtClean="0"/>
-              <a:t>© EV3Lessons.com, 2016, (Last edit: 7/04/2016)</a:t>
+              <a:t>© EV3Lessons.com, 2016, (Last edit: 7/26/2016)</a:t>
             </a:r>
             <a:endParaRPr lang="en-US"/>
           </a:p>
@@ -7911,131 +8006,6 @@
               <a:t>3</a:t>
             </a:fld>
             <a:endParaRPr lang="en-US"/>
-          </a:p>
-        </p:txBody>
-      </p:sp>
-      <p:pic>
-        <p:nvPicPr>
-          <p:cNvPr id="5" name="Picture 4" descr="images.jpg"/>
-          <p:cNvPicPr>
-            <a:picLocks noChangeAspect="1"/>
-          </p:cNvPicPr>
-          <p:nvPr/>
-        </p:nvPicPr>
-        <p:blipFill>
-          <a:blip r:embed="rId2">
-            <a:extLst>
-              <a:ext uri="{BEBA8EAE-BF5A-486C-A8C5-ECC9F3942E4B}">
-                <a14:imgProps xmlns:a14="http://schemas.microsoft.com/office/drawing/2010/main">
-                  <a14:imgLayer r:embed="rId3">
-                    <a14:imgEffect>
-                      <a14:backgroundRemoval t="4372" b="98087" l="0" r="100000">
-                        <a14:backgroundMark x1="74545" y1="44536" x2="74545" y2="44536"/>
-                        <a14:backgroundMark x1="81273" y1="48087" x2="81273" y2="48087"/>
-                        <a14:backgroundMark x1="61636" y1="42350" x2="61636" y2="42350"/>
-                        <a14:backgroundMark x1="57455" y1="42896" x2="57455" y2="42896"/>
-                      </a14:backgroundRemoval>
-                    </a14:imgEffect>
-                  </a14:imgLayer>
-                </a14:imgProps>
-              </a:ext>
-              <a:ext uri="{28A0092B-C50C-407E-A947-70E740481C1C}">
-                <a14:useLocalDpi xmlns:a14="http://schemas.microsoft.com/office/drawing/2010/main" val="0"/>
-              </a:ext>
-            </a:extLst>
-          </a:blip>
-          <a:stretch>
-            <a:fillRect/>
-          </a:stretch>
-        </p:blipFill>
-        <p:spPr>
-          <a:xfrm>
-            <a:off x="6500657" y="5949856"/>
-            <a:ext cx="1546040" cy="926818"/>
-          </a:xfrm>
-          <a:prstGeom prst="rect">
-            <a:avLst/>
-          </a:prstGeom>
-        </p:spPr>
-      </p:pic>
-      <p:sp>
-        <p:nvSpPr>
-          <p:cNvPr id="4" name="TextBox 3"/>
-          <p:cNvSpPr txBox="1"/>
-          <p:nvPr/>
-        </p:nvSpPr>
-        <p:spPr>
-          <a:xfrm>
-            <a:off x="316078" y="4732176"/>
-            <a:ext cx="8272751" cy="1323439"/>
-          </a:xfrm>
-          <a:prstGeom prst="rect">
-            <a:avLst/>
-          </a:prstGeom>
-          <a:noFill/>
-        </p:spPr>
-        <p:txBody>
-          <a:bodyPr wrap="square" rtlCol="0">
-            <a:spAutoFit/>
-          </a:bodyPr>
-          <a:lstStyle/>
-          <a:p>
-            <a:r>
-              <a:rPr lang="en-US" sz="2400" dirty="0" smtClean="0"/>
-              <a:t>But this will not work for running the two blocks forever</a:t>
-            </a:r>
-          </a:p>
-          <a:p>
-            <a:endParaRPr lang="en-US" sz="2400" dirty="0">
-              <a:solidFill>
-                <a:srgbClr val="FF0000"/>
-              </a:solidFill>
-            </a:endParaRPr>
-          </a:p>
-          <a:p>
-            <a:r>
-              <a:rPr lang="en-US" sz="3200" dirty="0" smtClean="0">
-                <a:solidFill>
-                  <a:srgbClr val="FF0000"/>
-                </a:solidFill>
-              </a:rPr>
-              <a:t>Is there a way to accomplish our goal?</a:t>
-            </a:r>
-            <a:endParaRPr lang="en-US" sz="3200" dirty="0">
-              <a:solidFill>
-                <a:srgbClr val="FF0000"/>
-              </a:solidFill>
-            </a:endParaRPr>
-          </a:p>
-        </p:txBody>
-      </p:sp>
-      <p:sp>
-        <p:nvSpPr>
-          <p:cNvPr id="10" name="TextBox 9"/>
-          <p:cNvSpPr txBox="1"/>
-          <p:nvPr/>
-        </p:nvSpPr>
-        <p:spPr>
-          <a:xfrm>
-            <a:off x="5988107" y="6315442"/>
-            <a:ext cx="659293" cy="369332"/>
-          </a:xfrm>
-          <a:prstGeom prst="rect">
-            <a:avLst/>
-          </a:prstGeom>
-          <a:noFill/>
-        </p:spPr>
-        <p:txBody>
-          <a:bodyPr wrap="none" rtlCol="0">
-            <a:spAutoFit/>
-          </a:bodyPr>
-          <a:lstStyle/>
-          <a:p>
-            <a:r>
-              <a:rPr lang="en-US" dirty="0" smtClean="0"/>
-              <a:t>Hint:</a:t>
-            </a:r>
-            <a:endParaRPr lang="en-US" dirty="0"/>
           </a:p>
         </p:txBody>
       </p:sp>
@@ -8410,36 +8380,6 @@
           </p:txBody>
         </p:sp>
       </p:grpSp>
-      <p:pic>
-        <p:nvPicPr>
-          <p:cNvPr id="11" name="Picture 10"/>
-          <p:cNvPicPr>
-            <a:picLocks noChangeAspect="1"/>
-          </p:cNvPicPr>
-          <p:nvPr/>
-        </p:nvPicPr>
-        <p:blipFill>
-          <a:blip r:embed="rId4">
-            <a:extLst>
-              <a:ext uri="{28A0092B-C50C-407E-A947-70E740481C1C}">
-                <a14:useLocalDpi xmlns:a14="http://schemas.microsoft.com/office/drawing/2010/main" val="0"/>
-              </a:ext>
-            </a:extLst>
-          </a:blip>
-          <a:stretch>
-            <a:fillRect/>
-          </a:stretch>
-        </p:blipFill>
-        <p:spPr>
-          <a:xfrm>
-            <a:off x="179160" y="3483376"/>
-            <a:ext cx="8523514" cy="1081414"/>
-          </a:xfrm>
-          <a:prstGeom prst="rect">
-            <a:avLst/>
-          </a:prstGeom>
-        </p:spPr>
-      </p:pic>
     </p:spTree>
     <p:extLst>
       <p:ext uri="{BB962C8B-B14F-4D97-AF65-F5344CB8AC3E}">
@@ -8499,7 +8439,7 @@
         </p:blipFill>
         <p:spPr>
           <a:xfrm>
-            <a:off x="6139542" y="2011091"/>
+            <a:off x="6106885" y="1336176"/>
             <a:ext cx="2212951" cy="2101798"/>
           </a:xfrm>
           <a:prstGeom prst="rect">
@@ -8543,7 +8483,7 @@
         <p:spPr>
           <a:xfrm>
             <a:off x="457200" y="1600199"/>
-            <a:ext cx="8121818" cy="5025381"/>
+            <a:ext cx="5094514" cy="5025381"/>
           </a:xfrm>
         </p:spPr>
         <p:txBody>
@@ -8554,19 +8494,51 @@
           <a:p>
             <a:r>
               <a:rPr lang="en-US" dirty="0" smtClean="0"/>
-              <a:t>Loops make repeating a task multiple times easy</a:t>
-            </a:r>
+              <a:t>Loops make repeating a task multiple times </a:t>
+            </a:r>
+            <a:r>
+              <a:rPr lang="en-US" dirty="0" smtClean="0"/>
+              <a:t>easy</a:t>
+            </a:r>
+          </a:p>
+          <a:p>
+            <a:r>
+              <a:rPr lang="en-US" dirty="0" smtClean="0"/>
+              <a:t>The added benefit is that </a:t>
+            </a:r>
+            <a:r>
+              <a:rPr lang="en-US" dirty="0" smtClean="0"/>
+              <a:t>a </a:t>
+            </a:r>
+            <a:r>
+              <a:rPr lang="en-US" dirty="0" smtClean="0"/>
+              <a:t>loop </a:t>
+            </a:r>
+            <a:r>
+              <a:rPr lang="en-US" dirty="0" smtClean="0"/>
+              <a:t>can end </a:t>
+            </a:r>
+            <a:r>
+              <a:rPr lang="en-US" dirty="0" smtClean="0"/>
+              <a:t>whenever you </a:t>
+            </a:r>
+            <a:r>
+              <a:rPr lang="en-US" dirty="0" smtClean="0"/>
+              <a:t>want (a specific number of times, run forever, a specific condition, </a:t>
+            </a:r>
+            <a:r>
+              <a:rPr lang="en-US" dirty="0" err="1" smtClean="0"/>
+              <a:t>etc</a:t>
+            </a:r>
+            <a:r>
+              <a:rPr lang="en-US" dirty="0" smtClean="0"/>
+              <a:t>)</a:t>
+            </a:r>
+            <a:endParaRPr lang="en-US" dirty="0" smtClean="0"/>
           </a:p>
           <a:p>
             <a:pPr lvl="1"/>
-            <a:r>
-              <a:rPr lang="en-US" dirty="0" smtClean="0"/>
-              <a:t>You can have a loop end whenever you want</a:t>
-            </a:r>
-          </a:p>
-          <a:p>
-            <a:pPr lvl="1"/>
-            <a:endParaRPr lang="en-US"/>
+            <a:endParaRPr lang="en-US" dirty="0"/>
           </a:p>
           <a:p>
             <a:pPr lvl="1"/>
@@ -8615,7 +8587,7 @@
           <a:p>
             <a:r>
               <a:rPr lang="en-US" smtClean="0"/>
-              <a:t>© EV3Lessons.com, 2016, (Last edit: 7/04/2016)</a:t>
+              <a:t>© EV3Lessons.com, 2016, (Last edit: 7/26/2016)</a:t>
             </a:r>
             <a:endParaRPr lang="en-US"/>
           </a:p>
@@ -8644,50 +8616,6 @@
           </a:p>
         </p:txBody>
       </p:sp>
-      <p:pic>
-        <p:nvPicPr>
-          <p:cNvPr id="5" name="Picture 4" descr="images.jpg"/>
-          <p:cNvPicPr>
-            <a:picLocks noChangeAspect="1"/>
-          </p:cNvPicPr>
-          <p:nvPr/>
-        </p:nvPicPr>
-        <p:blipFill>
-          <a:blip r:embed="rId3">
-            <a:extLst>
-              <a:ext uri="{BEBA8EAE-BF5A-486C-A8C5-ECC9F3942E4B}">
-                <a14:imgProps xmlns:a14="http://schemas.microsoft.com/office/drawing/2010/main">
-                  <a14:imgLayer r:embed="rId4">
-                    <a14:imgEffect>
-                      <a14:backgroundRemoval t="4372" b="98087" l="0" r="100000">
-                        <a14:backgroundMark x1="74545" y1="44536" x2="74545" y2="44536"/>
-                        <a14:backgroundMark x1="81273" y1="48087" x2="81273" y2="48087"/>
-                        <a14:backgroundMark x1="61636" y1="42350" x2="61636" y2="42350"/>
-                        <a14:backgroundMark x1="57455" y1="42896" x2="57455" y2="42896"/>
-                      </a14:backgroundRemoval>
-                    </a14:imgEffect>
-                  </a14:imgLayer>
-                </a14:imgProps>
-              </a:ext>
-              <a:ext uri="{28A0092B-C50C-407E-A947-70E740481C1C}">
-                <a14:useLocalDpi xmlns:a14="http://schemas.microsoft.com/office/drawing/2010/main" val="0"/>
-              </a:ext>
-            </a:extLst>
-          </a:blip>
-          <a:stretch>
-            <a:fillRect/>
-          </a:stretch>
-        </p:blipFill>
-        <p:spPr>
-          <a:xfrm>
-            <a:off x="2461013" y="-215123"/>
-            <a:ext cx="2000335" cy="1331132"/>
-          </a:xfrm>
-          <a:prstGeom prst="rect">
-            <a:avLst/>
-          </a:prstGeom>
-        </p:spPr>
-      </p:pic>
       <p:pic>
         <p:nvPicPr>
           <p:cNvPr id="9" name="Picture 8" descr="Screen Shot 2014-08-07 at 12.27.34 PM.png"/>
@@ -8697,7 +8625,7 @@
           <p:nvPr/>
         </p:nvPicPr>
         <p:blipFill>
-          <a:blip r:embed="rId5">
+          <a:blip r:embed="rId3">
             <a:extLst>
               <a:ext uri="{28A0092B-C50C-407E-A947-70E740481C1C}">
                 <a14:useLocalDpi xmlns:a14="http://schemas.microsoft.com/office/drawing/2010/main" val="0"/>
@@ -8726,7 +8654,7 @@
         </p:nvGrpSpPr>
         <p:grpSpPr>
           <a:xfrm>
-            <a:off x="6760029" y="3599186"/>
+            <a:off x="6727372" y="2924271"/>
             <a:ext cx="1635609" cy="3177534"/>
             <a:chOff x="4880429" y="372201"/>
             <a:chExt cx="2476500" cy="5514615"/>
@@ -8741,7 +8669,7 @@
             <p:nvPr/>
           </p:nvPicPr>
           <p:blipFill rotWithShape="1">
-            <a:blip r:embed="rId6">
+            <a:blip r:embed="rId4">
               <a:extLst>
                 <a:ext uri="{28A0092B-C50C-407E-A947-70E740481C1C}">
                   <a14:useLocalDpi xmlns:a14="http://schemas.microsoft.com/office/drawing/2010/main" val="0"/>
@@ -8770,7 +8698,7 @@
             <p:nvPr/>
           </p:nvPicPr>
           <p:blipFill rotWithShape="1">
-            <a:blip r:embed="rId6">
+            <a:blip r:embed="rId4">
               <a:extLst>
                 <a:ext uri="{28A0092B-C50C-407E-A947-70E740481C1C}">
                   <a14:useLocalDpi xmlns:a14="http://schemas.microsoft.com/office/drawing/2010/main" val="0"/>
@@ -8850,7 +8778,7 @@
         </p:blipFill>
         <p:spPr>
           <a:xfrm>
-            <a:off x="162321" y="4576713"/>
+            <a:off x="271180" y="3716741"/>
             <a:ext cx="8540353" cy="1355612"/>
           </a:xfrm>
           <a:prstGeom prst="rect">
@@ -8891,9 +8819,16 @@
             <p:ph idx="1"/>
           </p:nvPr>
         </p:nvSpPr>
-        <p:spPr/>
-        <p:txBody>
-          <a:bodyPr/>
+        <p:spPr>
+          <a:xfrm>
+            <a:off x="457200" y="1306285"/>
+            <a:ext cx="8245474" cy="4373563"/>
+          </a:xfrm>
+        </p:spPr>
+        <p:txBody>
+          <a:bodyPr>
+            <a:normAutofit fontScale="92500" lnSpcReduction="10000"/>
+          </a:bodyPr>
           <a:lstStyle/>
           <a:p>
             <a:r>
@@ -8964,7 +8899,7 @@
                   <a:srgbClr val="FF0000"/>
                 </a:solidFill>
               </a:rPr>
-              <a:t>The code should be an improvement on the code below (needs to use loops):</a:t>
+              <a:t>The simple way is to code it like this:</a:t>
             </a:r>
           </a:p>
           <a:p>
@@ -8974,6 +8909,42 @@
               </a:solidFill>
             </a:endParaRPr>
           </a:p>
+          <a:p>
+            <a:endParaRPr lang="en-US" dirty="0" smtClean="0">
+              <a:solidFill>
+                <a:srgbClr val="FF0000"/>
+              </a:solidFill>
+            </a:endParaRPr>
+          </a:p>
+          <a:p>
+            <a:endParaRPr lang="en-US" dirty="0">
+              <a:solidFill>
+                <a:srgbClr val="FF0000"/>
+              </a:solidFill>
+            </a:endParaRPr>
+          </a:p>
+          <a:p>
+            <a:endParaRPr lang="en-US" dirty="0" smtClean="0">
+              <a:solidFill>
+                <a:srgbClr val="FF0000"/>
+              </a:solidFill>
+            </a:endParaRPr>
+          </a:p>
+          <a:p>
+            <a:r>
+              <a:rPr lang="en-US" dirty="0" smtClean="0">
+                <a:solidFill>
+                  <a:srgbClr val="FF0000"/>
+                </a:solidFill>
+              </a:rPr>
+              <a:t>Use a loop to improve the code</a:t>
+            </a:r>
+            <a:endParaRPr lang="en-US" dirty="0">
+              <a:solidFill>
+                <a:srgbClr val="FF0000"/>
+              </a:solidFill>
+            </a:endParaRPr>
+          </a:p>
         </p:txBody>
       </p:sp>
       <p:sp>
@@ -8993,7 +8964,7 @@
           <a:p>
             <a:r>
               <a:rPr lang="en-US" smtClean="0"/>
-              <a:t>© EV3Lessons.com, 2016, (Last edit: 7/04/2016)</a:t>
+              <a:t>© EV3Lessons.com, 2016, (Last edit: 7/26/2016)</a:t>
             </a:r>
             <a:endParaRPr lang="en-US"/>
           </a:p>
@@ -9030,7 +9001,7 @@
         </p:nvGrpSpPr>
         <p:grpSpPr>
           <a:xfrm>
-            <a:off x="3254828" y="2369021"/>
+            <a:off x="3254828" y="1922706"/>
             <a:ext cx="1494707" cy="1226337"/>
             <a:chOff x="3886200" y="3370870"/>
             <a:chExt cx="1494707" cy="1226337"/>
@@ -9478,7 +9449,7 @@
           <a:p>
             <a:r>
               <a:rPr lang="en-US" smtClean="0"/>
-              <a:t>© EV3Lessons.com, 2016, (Last edit: 7/04/2016)</a:t>
+              <a:t>© EV3Lessons.com, 2016, (Last edit: 7/26/2016)</a:t>
             </a:r>
             <a:endParaRPr lang="en-US"/>
           </a:p>
@@ -9785,7 +9756,7 @@
           <a:p>
             <a:r>
               <a:rPr lang="en-US" smtClean="0"/>
-              <a:t>© EV3Lessons.com, 2016, (Last edit: 7/04/2016)</a:t>
+              <a:t>© EV3Lessons.com, 2016, (Last edit: 7/26/2016)</a:t>
             </a:r>
             <a:endParaRPr lang="en-US" dirty="0"/>
           </a:p>
@@ -9839,7 +9810,7 @@
           <a:effectLst/>
           <a:extLst>
             <a:ext uri="{91240B29-F687-4f45-9708-019B960494DF}">
-              <a14:hiddenLine xmlns:a14="http://schemas.microsoft.com/office/drawing/2010/main" xmlns="" w="9525">
+              <a14:hiddenLine xmlns="" xmlns:a14="http://schemas.microsoft.com/office/drawing/2010/main" w="9525">
                 <a:solidFill>
                   <a:schemeClr val="tx1"/>
                 </a:solidFill>
@@ -9849,7 +9820,7 @@
               </a14:hiddenLine>
             </a:ext>
             <a:ext uri="{AF507438-7753-43e0-B8FC-AC1667EBCBE1}">
-              <a14:hiddenEffects xmlns:a14="http://schemas.microsoft.com/office/drawing/2010/main" xmlns="">
+              <a14:hiddenEffects xmlns="" xmlns:a14="http://schemas.microsoft.com/office/drawing/2010/main">
                 <a:effectLst>
                   <a:outerShdw dist="35921" dir="2700000" algn="ctr" rotWithShape="0">
                     <a:schemeClr val="bg2"/>
@@ -10202,7 +10173,7 @@
           <a:noFill/>
           <a:extLst>
             <a:ext uri="{909E8E84-426E-40dd-AFC4-6F175D3DCCD1}">
-              <a14:hiddenFill xmlns:a14="http://schemas.microsoft.com/office/drawing/2010/main" xmlns="">
+              <a14:hiddenFill xmlns="" xmlns:a14="http://schemas.microsoft.com/office/drawing/2010/main">
                 <a:solidFill>
                   <a:srgbClr val="FFFFFF"/>
                 </a:solidFill>

</xml_diff>